<commit_message>
new agenda and template
</commit_message>
<xml_diff>
--- a/assets/docs/template.pptx
+++ b/assets/docs/template.pptx
@@ -203,7 +203,7 @@
           <a:p>
             <a:fld id="{6D18B252-1B11-4BC5-9FA8-A08B011CAD96}" type="datetimeFigureOut">
               <a:rPr lang="en-US" smtClean="0"/>
-              <a:t>2022-01-18</a:t>
+              <a:t>2022-02-11</a:t>
             </a:fld>
             <a:endParaRPr lang="en-US"/>
           </a:p>
@@ -627,6 +627,79 @@
           </a:prstGeom>
         </p:spPr>
       </p:pic>
+      <p:sp>
+        <p:nvSpPr>
+          <p:cNvPr id="5" name="TextBox 4">
+            <a:extLst>
+              <a:ext uri="{FF2B5EF4-FFF2-40B4-BE49-F238E27FC236}">
+                <a16:creationId xmlns:a16="http://schemas.microsoft.com/office/drawing/2014/main" id="{4F0D8BCE-5534-450A-A112-906CAD2403D1}"/>
+              </a:ext>
+            </a:extLst>
+          </p:cNvPr>
+          <p:cNvSpPr txBox="1"/>
+          <p:nvPr userDrawn="1"/>
+        </p:nvSpPr>
+        <p:spPr>
+          <a:xfrm>
+            <a:off x="2978459" y="6519446"/>
+            <a:ext cx="6235082" cy="338554"/>
+          </a:xfrm>
+          <a:prstGeom prst="rect">
+            <a:avLst/>
+          </a:prstGeom>
+          <a:noFill/>
+        </p:spPr>
+        <p:txBody>
+          <a:bodyPr wrap="square">
+            <a:spAutoFit/>
+          </a:bodyPr>
+          <a:lstStyle/>
+          <a:p>
+            <a:pPr algn="ctr"/>
+            <a:r>
+              <a:rPr kumimoji="0" lang="en-US" sz="1600" b="0" i="0" u="none" strike="noStrike" kern="1200" cap="none" spc="0" normalizeH="0" baseline="0" noProof="0" dirty="0">
+                <a:ln>
+                  <a:noFill/>
+                </a:ln>
+                <a:solidFill>
+                  <a:schemeClr val="bg2">
+                    <a:lumMod val="50000"/>
+                    <a:lumOff val="50000"/>
+                  </a:schemeClr>
+                </a:solidFill>
+                <a:effectLst/>
+                <a:uLnTx/>
+                <a:uFillTx/>
+                <a:latin typeface="Source Sans Pro" panose="020B0503030403020204" pitchFamily="34" charset="0"/>
+                <a:ea typeface="Source Sans Pro" panose="020B0503030403020204" pitchFamily="34" charset="0"/>
+                <a:cs typeface="+mn-cs"/>
+              </a:rPr>
+              <a:t>Universidad Carlos III de Madrid, </a:t>
+            </a:r>
+            <a:r>
+              <a:rPr lang="en-US" sz="1600" dirty="0">
+                <a:solidFill>
+                  <a:schemeClr val="bg2">
+                    <a:lumMod val="50000"/>
+                    <a:lumOff val="50000"/>
+                  </a:schemeClr>
+                </a:solidFill>
+                <a:latin typeface="Source Sans Pro" panose="020B0503030403020204" pitchFamily="34" charset="0"/>
+                <a:ea typeface="Source Sans Pro" panose="020B0503030403020204" pitchFamily="34" charset="0"/>
+              </a:rPr>
+              <a:t>February 16-18, 2022</a:t>
+            </a:r>
+            <a:endParaRPr lang="en-US" sz="1600" dirty="0">
+              <a:solidFill>
+                <a:schemeClr val="bg2">
+                  <a:lumMod val="50000"/>
+                  <a:lumOff val="50000"/>
+                </a:schemeClr>
+              </a:solidFill>
+            </a:endParaRPr>
+          </a:p>
+        </p:txBody>
+      </p:sp>
     </p:spTree>
     <p:extLst>
       <p:ext uri="{BB962C8B-B14F-4D97-AF65-F5344CB8AC3E}">

</xml_diff>